<commit_message>
Completed LangGraph Agent demo
</commit_message>
<xml_diff>
--- a/test.pptx
+++ b/test.pptx
@@ -3104,7 +3104,7 @@
           <a:lstStyle/>
           <a:p>
             <a:r>
-              <a:t>Adding an AutoShape</a:t>
+              <a:t>Incorporating GenAI into Client Workflow</a:t>
             </a:r>
           </a:p>
         </p:txBody>
@@ -3132,17 +3132,7 @@
           <a:lstStyle/>
           <a:p>
             <a:r>
-              <a:t>This is text inside a textbox</a:t>
-            </a:r>
-          </a:p>
-          <a:p>
-            <a:r>
-              <a:t>This is a second paragraph that's bold</a:t>
-            </a:r>
-          </a:p>
-          <a:p>
-            <a:r>
-              <a:t>This is a third paragraph that's big</a:t>
+              <a:t>{'Introduction': {'content': 'Brief overview of GenAI and its benefits for clients.'}, 'Understanding GenAI': {'content': 'Explanation of what GenAI is and how it works.'}, 'Benefits of GenAI': {'content': 'Highlight the advantages of incorporating GenAI into workflow.'}, 'Integration Process': {'content': 'Step-by-step guide on how clients can integrate GenAI into their existing workflow.'}, 'Best Practices': {'content': 'Recommendations on how to maximize the effectiveness of GenAI in workflow.'}, 'Case Studies': {'content': 'Real-life examples of companies successfully using GenAI in their workflow.'}, 'Q&amp;A': {'content': 'Open the floor for questions and provide answers to common queries.'}, 'Conclusion': {'content': 'Summarize key points and encourage clients to start incorporating GenAI into their workflow.'}}</a:t>
             </a:r>
           </a:p>
         </p:txBody>

</xml_diff>